<commit_message>
add the tree,blob,commit produce process
</commit_message>
<xml_diff>
--- a/GitStudy/.gitContentStudy.pptx
+++ b/GitStudy/.gitContentStudy.pptx
@@ -7,6 +7,7 @@
   <p:sldIdLst>
     <p:sldId id="256" r:id="rId2"/>
     <p:sldId id="257" r:id="rId3"/>
+    <p:sldId id="258" r:id="rId4"/>
   </p:sldIdLst>
   <p:sldSz cx="12192000" cy="6858000"/>
   <p:notesSz cx="6858000" cy="9144000"/>
@@ -105,6 +106,11 @@
       </a:defRPr>
     </a:lvl9pPr>
   </p:defaultTextStyle>
+  <p:extLst>
+    <p:ext uri="{EFAFB233-063F-42B5-8137-9DF3F51BA10A}">
+      <p15:sldGuideLst xmlns:p15="http://schemas.microsoft.com/office/powerpoint/2012/main"/>
+    </p:ext>
+  </p:extLst>
 </p:presentation>
 </file>
 
@@ -255,7 +261,7 @@
           <a:p>
             <a:fld id="{595FB3E4-E0FF-429F-A03D-BC2618170DFD}" type="datetimeFigureOut">
               <a:rPr lang="zh-TW" altLang="en-US" smtClean="0"/>
-              <a:t>2023/1/6</a:t>
+              <a:t>2023/1/7</a:t>
             </a:fld>
             <a:endParaRPr lang="zh-TW" altLang="en-US"/>
           </a:p>
@@ -453,7 +459,7 @@
           <a:p>
             <a:fld id="{595FB3E4-E0FF-429F-A03D-BC2618170DFD}" type="datetimeFigureOut">
               <a:rPr lang="zh-TW" altLang="en-US" smtClean="0"/>
-              <a:t>2023/1/6</a:t>
+              <a:t>2023/1/7</a:t>
             </a:fld>
             <a:endParaRPr lang="zh-TW" altLang="en-US"/>
           </a:p>
@@ -661,7 +667,7 @@
           <a:p>
             <a:fld id="{595FB3E4-E0FF-429F-A03D-BC2618170DFD}" type="datetimeFigureOut">
               <a:rPr lang="zh-TW" altLang="en-US" smtClean="0"/>
-              <a:t>2023/1/6</a:t>
+              <a:t>2023/1/7</a:t>
             </a:fld>
             <a:endParaRPr lang="zh-TW" altLang="en-US"/>
           </a:p>
@@ -859,7 +865,7 @@
           <a:p>
             <a:fld id="{595FB3E4-E0FF-429F-A03D-BC2618170DFD}" type="datetimeFigureOut">
               <a:rPr lang="zh-TW" altLang="en-US" smtClean="0"/>
-              <a:t>2023/1/6</a:t>
+              <a:t>2023/1/7</a:t>
             </a:fld>
             <a:endParaRPr lang="zh-TW" altLang="en-US"/>
           </a:p>
@@ -1134,7 +1140,7 @@
           <a:p>
             <a:fld id="{595FB3E4-E0FF-429F-A03D-BC2618170DFD}" type="datetimeFigureOut">
               <a:rPr lang="zh-TW" altLang="en-US" smtClean="0"/>
-              <a:t>2023/1/6</a:t>
+              <a:t>2023/1/7</a:t>
             </a:fld>
             <a:endParaRPr lang="zh-TW" altLang="en-US"/>
           </a:p>
@@ -1399,7 +1405,7 @@
           <a:p>
             <a:fld id="{595FB3E4-E0FF-429F-A03D-BC2618170DFD}" type="datetimeFigureOut">
               <a:rPr lang="zh-TW" altLang="en-US" smtClean="0"/>
-              <a:t>2023/1/6</a:t>
+              <a:t>2023/1/7</a:t>
             </a:fld>
             <a:endParaRPr lang="zh-TW" altLang="en-US"/>
           </a:p>
@@ -1811,7 +1817,7 @@
           <a:p>
             <a:fld id="{595FB3E4-E0FF-429F-A03D-BC2618170DFD}" type="datetimeFigureOut">
               <a:rPr lang="zh-TW" altLang="en-US" smtClean="0"/>
-              <a:t>2023/1/6</a:t>
+              <a:t>2023/1/7</a:t>
             </a:fld>
             <a:endParaRPr lang="zh-TW" altLang="en-US"/>
           </a:p>
@@ -1952,7 +1958,7 @@
           <a:p>
             <a:fld id="{595FB3E4-E0FF-429F-A03D-BC2618170DFD}" type="datetimeFigureOut">
               <a:rPr lang="zh-TW" altLang="en-US" smtClean="0"/>
-              <a:t>2023/1/6</a:t>
+              <a:t>2023/1/7</a:t>
             </a:fld>
             <a:endParaRPr lang="zh-TW" altLang="en-US"/>
           </a:p>
@@ -2065,7 +2071,7 @@
           <a:p>
             <a:fld id="{595FB3E4-E0FF-429F-A03D-BC2618170DFD}" type="datetimeFigureOut">
               <a:rPr lang="zh-TW" altLang="en-US" smtClean="0"/>
-              <a:t>2023/1/6</a:t>
+              <a:t>2023/1/7</a:t>
             </a:fld>
             <a:endParaRPr lang="zh-TW" altLang="en-US"/>
           </a:p>
@@ -2376,7 +2382,7 @@
           <a:p>
             <a:fld id="{595FB3E4-E0FF-429F-A03D-BC2618170DFD}" type="datetimeFigureOut">
               <a:rPr lang="zh-TW" altLang="en-US" smtClean="0"/>
-              <a:t>2023/1/6</a:t>
+              <a:t>2023/1/7</a:t>
             </a:fld>
             <a:endParaRPr lang="zh-TW" altLang="en-US"/>
           </a:p>
@@ -2664,7 +2670,7 @@
           <a:p>
             <a:fld id="{595FB3E4-E0FF-429F-A03D-BC2618170DFD}" type="datetimeFigureOut">
               <a:rPr lang="zh-TW" altLang="en-US" smtClean="0"/>
-              <a:t>2023/1/6</a:t>
+              <a:t>2023/1/7</a:t>
             </a:fld>
             <a:endParaRPr lang="zh-TW" altLang="en-US"/>
           </a:p>
@@ -2905,7 +2911,7 @@
           <a:p>
             <a:fld id="{595FB3E4-E0FF-429F-A03D-BC2618170DFD}" type="datetimeFigureOut">
               <a:rPr lang="zh-TW" altLang="en-US" smtClean="0"/>
-              <a:t>2023/1/6</a:t>
+              <a:t>2023/1/7</a:t>
             </a:fld>
             <a:endParaRPr lang="zh-TW" altLang="en-US"/>
           </a:p>
@@ -3404,7 +3410,7 @@
         <p:spPr>
           <a:xfrm>
             <a:off x="711200" y="548640"/>
-            <a:ext cx="11620169" cy="1846659"/>
+            <a:ext cx="11645817" cy="4955203"/>
           </a:xfrm>
           <a:prstGeom prst="rect">
             <a:avLst/>
@@ -3589,6 +3595,148 @@
               <a:rPr lang="zh-CN" altLang="en-US" dirty="0"/>
               <a:t>通常是一個提交對象</a:t>
             </a:r>
+            <a:endParaRPr lang="en-US" altLang="zh-CN" dirty="0"/>
+          </a:p>
+          <a:p>
+            <a:endParaRPr lang="en-US" altLang="zh-TW" dirty="0"/>
+          </a:p>
+          <a:p>
+            <a:r>
+              <a:rPr lang="en-US" altLang="zh-CN" sz="2000" b="1" dirty="0"/>
+              <a:t>2. SHA1</a:t>
+            </a:r>
+            <a:r>
+              <a:rPr lang="zh-CN" altLang="en-US" sz="2000" b="1" dirty="0"/>
+              <a:t>值</a:t>
+            </a:r>
+            <a:endParaRPr lang="en-US" altLang="zh-CN" sz="2000" b="1" dirty="0"/>
+          </a:p>
+          <a:p>
+            <a:r>
+              <a:rPr lang="en-US" altLang="zh-TW" dirty="0"/>
+              <a:t>       </a:t>
+            </a:r>
+            <a:r>
+              <a:rPr lang="en-US" altLang="zh-CN" dirty="0"/>
+              <a:t>160</a:t>
+            </a:r>
+            <a:r>
+              <a:rPr lang="zh-CN" altLang="en-US" dirty="0"/>
+              <a:t>位的數字</a:t>
+            </a:r>
+            <a:r>
+              <a:rPr lang="en-US" altLang="zh-CN" dirty="0"/>
+              <a:t>, </a:t>
+            </a:r>
+            <a:r>
+              <a:rPr lang="zh-CN" altLang="en-US" dirty="0"/>
+              <a:t>使用</a:t>
+            </a:r>
+            <a:r>
+              <a:rPr lang="en-US" altLang="zh-CN" dirty="0"/>
+              <a:t>40</a:t>
+            </a:r>
+            <a:r>
+              <a:rPr lang="zh-CN" altLang="en-US" dirty="0"/>
+              <a:t>位的</a:t>
+            </a:r>
+            <a:r>
+              <a:rPr lang="en-US" altLang="zh-CN" dirty="0"/>
+              <a:t>16</a:t>
+            </a:r>
+            <a:r>
+              <a:rPr lang="zh-CN" altLang="en-US" dirty="0"/>
+              <a:t>進制數表示。通常</a:t>
+            </a:r>
+            <a:r>
+              <a:rPr lang="en-US" altLang="zh-CN" dirty="0"/>
+              <a:t>SHA1</a:t>
+            </a:r>
+            <a:r>
+              <a:rPr lang="zh-CN" altLang="en-US" dirty="0"/>
+              <a:t>值，散列碼和對象</a:t>
+            </a:r>
+            <a:r>
+              <a:rPr lang="en-US" altLang="zh-CN" dirty="0"/>
+              <a:t>ID</a:t>
+            </a:r>
+            <a:r>
+              <a:rPr lang="zh-CN" altLang="en-US" dirty="0"/>
+              <a:t>指的是同一個東西</a:t>
+            </a:r>
+            <a:endParaRPr lang="en-US" altLang="zh-CN" dirty="0"/>
+          </a:p>
+          <a:p>
+            <a:endParaRPr lang="en-US" altLang="zh-TW" dirty="0"/>
+          </a:p>
+          <a:p>
+            <a:r>
+              <a:rPr lang="en-US" altLang="zh-CN" sz="2000" b="1" dirty="0"/>
+              <a:t>3. </a:t>
+            </a:r>
+            <a:r>
+              <a:rPr lang="zh-CN" altLang="en-US" sz="2000" b="1" dirty="0"/>
+              <a:t>讀取</a:t>
+            </a:r>
+            <a:r>
+              <a:rPr lang="en-US" altLang="zh-CN" sz="2000" b="1" dirty="0"/>
+              <a:t>SHA1</a:t>
+            </a:r>
+            <a:r>
+              <a:rPr lang="zh-CN" altLang="en-US" sz="2000" b="1" dirty="0"/>
+              <a:t>的内容</a:t>
+            </a:r>
+            <a:r>
+              <a:rPr lang="en-US" altLang="zh-CN" sz="2000" b="1" dirty="0"/>
+              <a:t>(commit, blob, tree)</a:t>
+            </a:r>
+          </a:p>
+          <a:p>
+            <a:r>
+              <a:rPr lang="en-US" altLang="zh-TW" dirty="0"/>
+              <a:t>        </a:t>
+            </a:r>
+            <a:r>
+              <a:rPr lang="en-US" altLang="zh-CN" dirty="0"/>
+              <a:t>git cat-file –p SHA1</a:t>
+            </a:r>
+            <a:r>
+              <a:rPr lang="zh-CN" altLang="en-US" dirty="0"/>
+              <a:t>碼</a:t>
+            </a:r>
+            <a:endParaRPr lang="en-US" altLang="zh-CN" dirty="0"/>
+          </a:p>
+          <a:p>
+            <a:endParaRPr lang="en-US" altLang="zh-TW" dirty="0"/>
+          </a:p>
+          <a:p>
+            <a:r>
+              <a:rPr lang="en-US" altLang="zh-CN" dirty="0"/>
+              <a:t>4. </a:t>
+            </a:r>
+            <a:r>
+              <a:rPr lang="zh-CN" altLang="en-US" dirty="0"/>
+              <a:t>生產</a:t>
+            </a:r>
+            <a:r>
+              <a:rPr lang="en-US" altLang="zh-CN" dirty="0"/>
+              <a:t>three</a:t>
+            </a:r>
+          </a:p>
+          <a:p>
+            <a:r>
+              <a:rPr lang="en-US" altLang="zh-TW" dirty="0"/>
+              <a:t>       git write-tree</a:t>
+            </a:r>
+          </a:p>
+          <a:p>
+            <a:endParaRPr lang="en-US" altLang="zh-TW" dirty="0"/>
+          </a:p>
+          <a:p>
+            <a:r>
+              <a:rPr lang="en-US" altLang="zh-TW"/>
+              <a:t>5. </a:t>
+            </a:r>
             <a:endParaRPr lang="zh-TW" altLang="en-US" dirty="0"/>
           </a:p>
         </p:txBody>
@@ -3597,6 +3745,136 @@
     <p:extLst>
       <p:ext uri="{BB962C8B-B14F-4D97-AF65-F5344CB8AC3E}">
         <p14:creationId xmlns:p14="http://schemas.microsoft.com/office/powerpoint/2010/main" val="1164742724"/>
+      </p:ext>
+    </p:extLst>
+  </p:cSld>
+  <p:clrMapOvr>
+    <a:masterClrMapping/>
+  </p:clrMapOvr>
+</p:sld>
+</file>
+
+<file path=ppt/slides/slide3.xml><?xml version="1.0" encoding="utf-8"?>
+<p:sld xmlns:a="http://schemas.openxmlformats.org/drawingml/2006/main" xmlns:r="http://schemas.openxmlformats.org/officeDocument/2006/relationships" xmlns:p="http://schemas.openxmlformats.org/presentationml/2006/main">
+  <p:cSld>
+    <p:spTree>
+      <p:nvGrpSpPr>
+        <p:cNvPr id="1" name=""/>
+        <p:cNvGrpSpPr/>
+        <p:nvPr/>
+      </p:nvGrpSpPr>
+      <p:grpSpPr>
+        <a:xfrm>
+          <a:off x="0" y="0"/>
+          <a:ext cx="0" cy="0"/>
+          <a:chOff x="0" y="0"/>
+          <a:chExt cx="0" cy="0"/>
+        </a:xfrm>
+      </p:grpSpPr>
+      <p:sp>
+        <p:nvSpPr>
+          <p:cNvPr id="4" name="文字方塊 3">
+            <a:extLst>
+              <a:ext uri="{FF2B5EF4-FFF2-40B4-BE49-F238E27FC236}">
+                <a16:creationId xmlns:a16="http://schemas.microsoft.com/office/drawing/2014/main" id="{5A1ED29C-C540-4306-AFF7-E9076115EA96}"/>
+              </a:ext>
+            </a:extLst>
+          </p:cNvPr>
+          <p:cNvSpPr txBox="1"/>
+          <p:nvPr/>
+        </p:nvSpPr>
+        <p:spPr>
+          <a:xfrm>
+            <a:off x="304800" y="294640"/>
+            <a:ext cx="5426294" cy="369332"/>
+          </a:xfrm>
+          <a:prstGeom prst="rect">
+            <a:avLst/>
+          </a:prstGeom>
+          <a:noFill/>
+        </p:spPr>
+        <p:txBody>
+          <a:bodyPr wrap="none" rtlCol="0">
+            <a:spAutoFit/>
+          </a:bodyPr>
+          <a:lstStyle/>
+          <a:p>
+            <a:r>
+              <a:rPr lang="zh-CN" altLang="en-US" dirty="0"/>
+              <a:t>兩次次</a:t>
+            </a:r>
+            <a:r>
+              <a:rPr lang="en-US" altLang="zh-CN" dirty="0"/>
+              <a:t>add</a:t>
+            </a:r>
+            <a:r>
+              <a:rPr lang="zh-CN" altLang="en-US" dirty="0"/>
+              <a:t>，</a:t>
+            </a:r>
+            <a:r>
+              <a:rPr lang="en-US" altLang="zh-CN" dirty="0"/>
+              <a:t>commit</a:t>
+            </a:r>
+            <a:r>
+              <a:rPr lang="zh-CN" altLang="en-US" dirty="0"/>
+              <a:t>后對象庫</a:t>
+            </a:r>
+            <a:r>
+              <a:rPr lang="en-US" altLang="zh-CN" dirty="0"/>
+              <a:t>(.git/objects)</a:t>
+            </a:r>
+            <a:r>
+              <a:rPr lang="zh-CN" altLang="en-US" dirty="0"/>
+              <a:t>變化圖示</a:t>
+            </a:r>
+            <a:r>
+              <a:rPr lang="en-US" altLang="zh-CN" dirty="0"/>
+              <a:t>:</a:t>
+            </a:r>
+            <a:endParaRPr lang="zh-TW" altLang="en-US" dirty="0"/>
+          </a:p>
+        </p:txBody>
+      </p:sp>
+      <p:pic>
+        <p:nvPicPr>
+          <p:cNvPr id="6" name="圖片 5">
+            <a:extLst>
+              <a:ext uri="{FF2B5EF4-FFF2-40B4-BE49-F238E27FC236}">
+                <a16:creationId xmlns:a16="http://schemas.microsoft.com/office/drawing/2014/main" id="{FB22B4A2-E484-4389-9840-FFF5E388D899}"/>
+              </a:ext>
+            </a:extLst>
+          </p:cNvPr>
+          <p:cNvPicPr>
+            <a:picLocks noChangeAspect="1"/>
+          </p:cNvPicPr>
+          <p:nvPr/>
+        </p:nvPicPr>
+        <p:blipFill>
+          <a:blip r:embed="rId2">
+            <a:extLst>
+              <a:ext uri="{28A0092B-C50C-407E-A947-70E740481C1C}">
+                <a14:useLocalDpi xmlns:a14="http://schemas.microsoft.com/office/drawing/2010/main" val="0"/>
+              </a:ext>
+            </a:extLst>
+          </a:blip>
+          <a:stretch>
+            <a:fillRect/>
+          </a:stretch>
+        </p:blipFill>
+        <p:spPr>
+          <a:xfrm>
+            <a:off x="1198880" y="1266695"/>
+            <a:ext cx="9326880" cy="5035809"/>
+          </a:xfrm>
+          <a:prstGeom prst="rect">
+            <a:avLst/>
+          </a:prstGeom>
+        </p:spPr>
+      </p:pic>
+    </p:spTree>
+    <p:extLst>
+      <p:ext uri="{BB962C8B-B14F-4D97-AF65-F5344CB8AC3E}">
+        <p14:creationId xmlns:p14="http://schemas.microsoft.com/office/powerpoint/2010/main" val="1139442607"/>
       </p:ext>
     </p:extLst>
   </p:cSld>

</xml_diff>

<commit_message>
add commit process and add ls-file command
</commit_message>
<xml_diff>
--- a/GitStudy/.gitContentStudy.pptx
+++ b/GitStudy/.gitContentStudy.pptx
@@ -261,7 +261,7 @@
           <a:p>
             <a:fld id="{595FB3E4-E0FF-429F-A03D-BC2618170DFD}" type="datetimeFigureOut">
               <a:rPr lang="zh-TW" altLang="en-US" smtClean="0"/>
-              <a:t>2023/1/7</a:t>
+              <a:t>2023/1/8</a:t>
             </a:fld>
             <a:endParaRPr lang="zh-TW" altLang="en-US"/>
           </a:p>
@@ -459,7 +459,7 @@
           <a:p>
             <a:fld id="{595FB3E4-E0FF-429F-A03D-BC2618170DFD}" type="datetimeFigureOut">
               <a:rPr lang="zh-TW" altLang="en-US" smtClean="0"/>
-              <a:t>2023/1/7</a:t>
+              <a:t>2023/1/8</a:t>
             </a:fld>
             <a:endParaRPr lang="zh-TW" altLang="en-US"/>
           </a:p>
@@ -667,7 +667,7 @@
           <a:p>
             <a:fld id="{595FB3E4-E0FF-429F-A03D-BC2618170DFD}" type="datetimeFigureOut">
               <a:rPr lang="zh-TW" altLang="en-US" smtClean="0"/>
-              <a:t>2023/1/7</a:t>
+              <a:t>2023/1/8</a:t>
             </a:fld>
             <a:endParaRPr lang="zh-TW" altLang="en-US"/>
           </a:p>
@@ -865,7 +865,7 @@
           <a:p>
             <a:fld id="{595FB3E4-E0FF-429F-A03D-BC2618170DFD}" type="datetimeFigureOut">
               <a:rPr lang="zh-TW" altLang="en-US" smtClean="0"/>
-              <a:t>2023/1/7</a:t>
+              <a:t>2023/1/8</a:t>
             </a:fld>
             <a:endParaRPr lang="zh-TW" altLang="en-US"/>
           </a:p>
@@ -1140,7 +1140,7 @@
           <a:p>
             <a:fld id="{595FB3E4-E0FF-429F-A03D-BC2618170DFD}" type="datetimeFigureOut">
               <a:rPr lang="zh-TW" altLang="en-US" smtClean="0"/>
-              <a:t>2023/1/7</a:t>
+              <a:t>2023/1/8</a:t>
             </a:fld>
             <a:endParaRPr lang="zh-TW" altLang="en-US"/>
           </a:p>
@@ -1405,7 +1405,7 @@
           <a:p>
             <a:fld id="{595FB3E4-E0FF-429F-A03D-BC2618170DFD}" type="datetimeFigureOut">
               <a:rPr lang="zh-TW" altLang="en-US" smtClean="0"/>
-              <a:t>2023/1/7</a:t>
+              <a:t>2023/1/8</a:t>
             </a:fld>
             <a:endParaRPr lang="zh-TW" altLang="en-US"/>
           </a:p>
@@ -1817,7 +1817,7 @@
           <a:p>
             <a:fld id="{595FB3E4-E0FF-429F-A03D-BC2618170DFD}" type="datetimeFigureOut">
               <a:rPr lang="zh-TW" altLang="en-US" smtClean="0"/>
-              <a:t>2023/1/7</a:t>
+              <a:t>2023/1/8</a:t>
             </a:fld>
             <a:endParaRPr lang="zh-TW" altLang="en-US"/>
           </a:p>
@@ -1958,7 +1958,7 @@
           <a:p>
             <a:fld id="{595FB3E4-E0FF-429F-A03D-BC2618170DFD}" type="datetimeFigureOut">
               <a:rPr lang="zh-TW" altLang="en-US" smtClean="0"/>
-              <a:t>2023/1/7</a:t>
+              <a:t>2023/1/8</a:t>
             </a:fld>
             <a:endParaRPr lang="zh-TW" altLang="en-US"/>
           </a:p>
@@ -2071,7 +2071,7 @@
           <a:p>
             <a:fld id="{595FB3E4-E0FF-429F-A03D-BC2618170DFD}" type="datetimeFigureOut">
               <a:rPr lang="zh-TW" altLang="en-US" smtClean="0"/>
-              <a:t>2023/1/7</a:t>
+              <a:t>2023/1/8</a:t>
             </a:fld>
             <a:endParaRPr lang="zh-TW" altLang="en-US"/>
           </a:p>
@@ -2382,7 +2382,7 @@
           <a:p>
             <a:fld id="{595FB3E4-E0FF-429F-A03D-BC2618170DFD}" type="datetimeFigureOut">
               <a:rPr lang="zh-TW" altLang="en-US" smtClean="0"/>
-              <a:t>2023/1/7</a:t>
+              <a:t>2023/1/8</a:t>
             </a:fld>
             <a:endParaRPr lang="zh-TW" altLang="en-US"/>
           </a:p>
@@ -2670,7 +2670,7 @@
           <a:p>
             <a:fld id="{595FB3E4-E0FF-429F-A03D-BC2618170DFD}" type="datetimeFigureOut">
               <a:rPr lang="zh-TW" altLang="en-US" smtClean="0"/>
-              <a:t>2023/1/7</a:t>
+              <a:t>2023/1/8</a:t>
             </a:fld>
             <a:endParaRPr lang="zh-TW" altLang="en-US"/>
           </a:p>
@@ -2911,7 +2911,7 @@
           <a:p>
             <a:fld id="{595FB3E4-E0FF-429F-A03D-BC2618170DFD}" type="datetimeFigureOut">
               <a:rPr lang="zh-TW" altLang="en-US" smtClean="0"/>
-              <a:t>2023/1/7</a:t>
+              <a:t>2023/1/8</a:t>
             </a:fld>
             <a:endParaRPr lang="zh-TW" altLang="en-US"/>
           </a:p>
@@ -3410,7 +3410,7 @@
         <p:spPr>
           <a:xfrm>
             <a:off x="711200" y="548640"/>
-            <a:ext cx="11645817" cy="4955203"/>
+            <a:ext cx="11645817" cy="5262979"/>
           </a:xfrm>
           <a:prstGeom prst="rect">
             <a:avLst/>
@@ -3711,22 +3711,43 @@
           </a:p>
           <a:p>
             <a:r>
-              <a:rPr lang="en-US" altLang="zh-CN" dirty="0"/>
-              <a:t>4. </a:t>
-            </a:r>
-            <a:r>
-              <a:rPr lang="zh-CN" altLang="en-US" dirty="0"/>
-              <a:t>生產</a:t>
-            </a:r>
-            <a:r>
-              <a:rPr lang="en-US" altLang="zh-CN" dirty="0"/>
-              <a:t>three</a:t>
-            </a:r>
-          </a:p>
-          <a:p>
+              <a:rPr lang="en-US" altLang="zh-CN" sz="2000" b="1" dirty="0"/>
+              <a:t>4</a:t>
+            </a:r>
+            <a:r>
+              <a:rPr lang="en-US" altLang="zh-CN" sz="2000" b="1" dirty="0" smtClean="0"/>
+              <a:t>. </a:t>
+            </a:r>
+            <a:r>
+              <a:rPr lang="zh-CN" altLang="en-US" sz="2000" b="1" dirty="0" smtClean="0"/>
+              <a:t>捕获索引状态被把它保存在</a:t>
+            </a:r>
+            <a:r>
+              <a:rPr lang="en-US" altLang="zh-CN" sz="2000" b="1" dirty="0" smtClean="0"/>
+              <a:t>tree</a:t>
+            </a:r>
+            <a:r>
+              <a:rPr lang="zh-CN" altLang="en-US" sz="2000" b="1" dirty="0" smtClean="0"/>
+              <a:t>里面</a:t>
+            </a:r>
+            <a:endParaRPr lang="en-US" altLang="zh-CN" sz="2000" b="1" dirty="0" smtClean="0"/>
+          </a:p>
+          <a:p>
+            <a:r>
+              <a:rPr lang="en-US" altLang="zh-TW" dirty="0" smtClean="0"/>
+              <a:t>       </a:t>
+            </a:r>
+            <a:r>
+              <a:rPr lang="en-US" altLang="zh-TW" dirty="0" err="1"/>
+              <a:t>git</a:t>
+            </a:r>
             <a:r>
               <a:rPr lang="en-US" altLang="zh-TW" dirty="0"/>
-              <a:t>       git write-tree</a:t>
+              <a:t> </a:t>
+            </a:r>
+            <a:r>
+              <a:rPr lang="en-US" altLang="zh-TW" dirty="0" smtClean="0"/>
+              <a:t>write-tree</a:t>
             </a:r>
           </a:p>
           <a:p>
@@ -3734,10 +3755,37 @@
           </a:p>
           <a:p>
             <a:r>
-              <a:rPr lang="en-US" altLang="zh-TW"/>
+              <a:rPr lang="en-US" altLang="zh-TW" sz="2000" b="1" dirty="0" smtClean="0"/>
               <a:t>5. </a:t>
             </a:r>
-            <a:endParaRPr lang="zh-TW" altLang="en-US" dirty="0"/>
+            <a:r>
+              <a:rPr lang="zh-CN" altLang="en-US" sz="2000" b="1" dirty="0" smtClean="0"/>
+              <a:t>查询目前</a:t>
+            </a:r>
+            <a:r>
+              <a:rPr lang="en-US" altLang="zh-CN" sz="2000" b="1" dirty="0" smtClean="0"/>
+              <a:t>tree</a:t>
+            </a:r>
+            <a:r>
+              <a:rPr lang="zh-CN" altLang="en-US" sz="2000" b="1" dirty="0" smtClean="0"/>
+              <a:t>里面的文件</a:t>
+            </a:r>
+            <a:endParaRPr lang="en-US" altLang="zh-CN" sz="2000" b="1" dirty="0" smtClean="0"/>
+          </a:p>
+          <a:p>
+            <a:r>
+              <a:rPr lang="en-US" altLang="zh-TW" dirty="0" smtClean="0"/>
+              <a:t>      </a:t>
+            </a:r>
+            <a:r>
+              <a:rPr lang="en-US" altLang="zh-CN" dirty="0" err="1" smtClean="0"/>
+              <a:t>git</a:t>
+            </a:r>
+            <a:r>
+              <a:rPr lang="en-US" altLang="zh-CN" dirty="0" smtClean="0"/>
+              <a:t> ls-files -s</a:t>
+            </a:r>
+            <a:endParaRPr lang="en-US" altLang="zh-TW" dirty="0"/>
           </a:p>
         </p:txBody>
       </p:sp>
@@ -3863,14 +3911,117 @@
         </p:blipFill>
         <p:spPr>
           <a:xfrm>
-            <a:off x="1198880" y="1266695"/>
-            <a:ext cx="9326880" cy="5035809"/>
+            <a:off x="4613565" y="2416660"/>
+            <a:ext cx="7467600" cy="4162935"/>
           </a:xfrm>
           <a:prstGeom prst="rect">
             <a:avLst/>
           </a:prstGeom>
         </p:spPr>
       </p:pic>
+      <p:sp>
+        <p:nvSpPr>
+          <p:cNvPr id="2" name="文本框 1"/>
+          <p:cNvSpPr txBox="1"/>
+          <p:nvPr/>
+        </p:nvSpPr>
+        <p:spPr>
+          <a:xfrm>
+            <a:off x="138545" y="1136073"/>
+            <a:ext cx="7273637" cy="923330"/>
+          </a:xfrm>
+          <a:prstGeom prst="rect">
+            <a:avLst/>
+          </a:prstGeom>
+          <a:noFill/>
+        </p:spPr>
+        <p:txBody>
+          <a:bodyPr wrap="square" rtlCol="0">
+            <a:spAutoFit/>
+          </a:bodyPr>
+          <a:lstStyle/>
+          <a:p>
+            <a:pPr marL="342900" indent="-342900">
+              <a:buAutoNum type="arabicPeriod"/>
+            </a:pPr>
+            <a:r>
+              <a:rPr lang="en-US" altLang="zh-CN" dirty="0" err="1" smtClean="0"/>
+              <a:t>git</a:t>
+            </a:r>
+            <a:r>
+              <a:rPr lang="en-US" altLang="zh-CN" dirty="0" smtClean="0"/>
+              <a:t>   add </a:t>
+            </a:r>
+            <a:r>
+              <a:rPr lang="zh-CN" altLang="en-US" dirty="0" smtClean="0"/>
+              <a:t>指令后产生</a:t>
+            </a:r>
+            <a:r>
+              <a:rPr lang="en-US" altLang="zh-CN" dirty="0" smtClean="0"/>
+              <a:t>blob</a:t>
+            </a:r>
+          </a:p>
+          <a:p>
+            <a:pPr marL="342900" indent="-342900">
+              <a:buAutoNum type="arabicPeriod"/>
+            </a:pPr>
+            <a:r>
+              <a:rPr lang="en-US" altLang="zh-CN" dirty="0" err="1" smtClean="0"/>
+              <a:t>git</a:t>
+            </a:r>
+            <a:r>
+              <a:rPr lang="en-US" altLang="zh-CN" dirty="0" smtClean="0"/>
+              <a:t>   commit</a:t>
+            </a:r>
+            <a:r>
+              <a:rPr lang="zh-CN" altLang="en-US" dirty="0" smtClean="0"/>
+              <a:t>产生</a:t>
+            </a:r>
+            <a:r>
+              <a:rPr lang="en-US" altLang="zh-CN" dirty="0" smtClean="0"/>
+              <a:t>commit</a:t>
+            </a:r>
+            <a:r>
+              <a:rPr lang="zh-CN" altLang="en-US" dirty="0" smtClean="0"/>
+              <a:t>和</a:t>
+            </a:r>
+            <a:r>
+              <a:rPr lang="en-US" altLang="zh-CN" dirty="0" smtClean="0"/>
+              <a:t>tree</a:t>
+            </a:r>
+          </a:p>
+          <a:p>
+            <a:pPr marL="342900" indent="-342900">
+              <a:buAutoNum type="arabicPeriod"/>
+            </a:pPr>
+            <a:r>
+              <a:rPr lang="zh-CN" altLang="en-US" dirty="0" smtClean="0"/>
+              <a:t>目录下的文件夹有文件会额外产生</a:t>
+            </a:r>
+            <a:r>
+              <a:rPr lang="en-US" altLang="zh-CN" dirty="0" smtClean="0"/>
+              <a:t>tree, </a:t>
+            </a:r>
+            <a:r>
+              <a:rPr lang="zh-CN" altLang="en-US" dirty="0" smtClean="0"/>
+              <a:t>此</a:t>
+            </a:r>
+            <a:r>
+              <a:rPr lang="en-US" altLang="zh-CN" dirty="0" smtClean="0"/>
+              <a:t>tree</a:t>
+            </a:r>
+            <a:r>
+              <a:rPr lang="zh-CN" altLang="en-US" dirty="0" smtClean="0"/>
+              <a:t>会指向上个</a:t>
+            </a:r>
+            <a:r>
+              <a:rPr lang="en-US" altLang="zh-CN" dirty="0" smtClean="0"/>
+              <a:t>blob </a:t>
+            </a:r>
+            <a:endParaRPr lang="zh-CN" altLang="en-US" dirty="0"/>
+          </a:p>
+        </p:txBody>
+      </p:sp>
     </p:spTree>
     <p:extLst>
       <p:ext uri="{BB962C8B-B14F-4D97-AF65-F5344CB8AC3E}">

</xml_diff>

<commit_message>
Study the git show --pretty=fuller command
</commit_message>
<xml_diff>
--- a/GitStudy/.gitContentStudy.pptx
+++ b/GitStudy/.gitContentStudy.pptx
@@ -261,7 +261,7 @@
           <a:p>
             <a:fld id="{595FB3E4-E0FF-429F-A03D-BC2618170DFD}" type="datetimeFigureOut">
               <a:rPr lang="zh-TW" altLang="en-US" smtClean="0"/>
-              <a:t>2023/1/8</a:t>
+              <a:t>2023/1/9</a:t>
             </a:fld>
             <a:endParaRPr lang="zh-TW" altLang="en-US"/>
           </a:p>
@@ -459,7 +459,7 @@
           <a:p>
             <a:fld id="{595FB3E4-E0FF-429F-A03D-BC2618170DFD}" type="datetimeFigureOut">
               <a:rPr lang="zh-TW" altLang="en-US" smtClean="0"/>
-              <a:t>2023/1/8</a:t>
+              <a:t>2023/1/9</a:t>
             </a:fld>
             <a:endParaRPr lang="zh-TW" altLang="en-US"/>
           </a:p>
@@ -667,7 +667,7 @@
           <a:p>
             <a:fld id="{595FB3E4-E0FF-429F-A03D-BC2618170DFD}" type="datetimeFigureOut">
               <a:rPr lang="zh-TW" altLang="en-US" smtClean="0"/>
-              <a:t>2023/1/8</a:t>
+              <a:t>2023/1/9</a:t>
             </a:fld>
             <a:endParaRPr lang="zh-TW" altLang="en-US"/>
           </a:p>
@@ -865,7 +865,7 @@
           <a:p>
             <a:fld id="{595FB3E4-E0FF-429F-A03D-BC2618170DFD}" type="datetimeFigureOut">
               <a:rPr lang="zh-TW" altLang="en-US" smtClean="0"/>
-              <a:t>2023/1/8</a:t>
+              <a:t>2023/1/9</a:t>
             </a:fld>
             <a:endParaRPr lang="zh-TW" altLang="en-US"/>
           </a:p>
@@ -1140,7 +1140,7 @@
           <a:p>
             <a:fld id="{595FB3E4-E0FF-429F-A03D-BC2618170DFD}" type="datetimeFigureOut">
               <a:rPr lang="zh-TW" altLang="en-US" smtClean="0"/>
-              <a:t>2023/1/8</a:t>
+              <a:t>2023/1/9</a:t>
             </a:fld>
             <a:endParaRPr lang="zh-TW" altLang="en-US"/>
           </a:p>
@@ -1405,7 +1405,7 @@
           <a:p>
             <a:fld id="{595FB3E4-E0FF-429F-A03D-BC2618170DFD}" type="datetimeFigureOut">
               <a:rPr lang="zh-TW" altLang="en-US" smtClean="0"/>
-              <a:t>2023/1/8</a:t>
+              <a:t>2023/1/9</a:t>
             </a:fld>
             <a:endParaRPr lang="zh-TW" altLang="en-US"/>
           </a:p>
@@ -1817,7 +1817,7 @@
           <a:p>
             <a:fld id="{595FB3E4-E0FF-429F-A03D-BC2618170DFD}" type="datetimeFigureOut">
               <a:rPr lang="zh-TW" altLang="en-US" smtClean="0"/>
-              <a:t>2023/1/8</a:t>
+              <a:t>2023/1/9</a:t>
             </a:fld>
             <a:endParaRPr lang="zh-TW" altLang="en-US"/>
           </a:p>
@@ -1958,7 +1958,7 @@
           <a:p>
             <a:fld id="{595FB3E4-E0FF-429F-A03D-BC2618170DFD}" type="datetimeFigureOut">
               <a:rPr lang="zh-TW" altLang="en-US" smtClean="0"/>
-              <a:t>2023/1/8</a:t>
+              <a:t>2023/1/9</a:t>
             </a:fld>
             <a:endParaRPr lang="zh-TW" altLang="en-US"/>
           </a:p>
@@ -2071,7 +2071,7 @@
           <a:p>
             <a:fld id="{595FB3E4-E0FF-429F-A03D-BC2618170DFD}" type="datetimeFigureOut">
               <a:rPr lang="zh-TW" altLang="en-US" smtClean="0"/>
-              <a:t>2023/1/8</a:t>
+              <a:t>2023/1/9</a:t>
             </a:fld>
             <a:endParaRPr lang="zh-TW" altLang="en-US"/>
           </a:p>
@@ -2382,7 +2382,7 @@
           <a:p>
             <a:fld id="{595FB3E4-E0FF-429F-A03D-BC2618170DFD}" type="datetimeFigureOut">
               <a:rPr lang="zh-TW" altLang="en-US" smtClean="0"/>
-              <a:t>2023/1/8</a:t>
+              <a:t>2023/1/9</a:t>
             </a:fld>
             <a:endParaRPr lang="zh-TW" altLang="en-US"/>
           </a:p>
@@ -2670,7 +2670,7 @@
           <a:p>
             <a:fld id="{595FB3E4-E0FF-429F-A03D-BC2618170DFD}" type="datetimeFigureOut">
               <a:rPr lang="zh-TW" altLang="en-US" smtClean="0"/>
-              <a:t>2023/1/8</a:t>
+              <a:t>2023/1/9</a:t>
             </a:fld>
             <a:endParaRPr lang="zh-TW" altLang="en-US"/>
           </a:p>
@@ -2911,7 +2911,7 @@
           <a:p>
             <a:fld id="{595FB3E4-E0FF-429F-A03D-BC2618170DFD}" type="datetimeFigureOut">
               <a:rPr lang="zh-TW" altLang="en-US" smtClean="0"/>
-              <a:t>2023/1/8</a:t>
+              <a:t>2023/1/9</a:t>
             </a:fld>
             <a:endParaRPr lang="zh-TW" altLang="en-US"/>
           </a:p>
@@ -3410,7 +3410,7 @@
         <p:spPr>
           <a:xfrm>
             <a:off x="711200" y="548640"/>
-            <a:ext cx="11645817" cy="5262979"/>
+            <a:ext cx="11645817" cy="6124754"/>
           </a:xfrm>
           <a:prstGeom prst="rect">
             <a:avLst/>
@@ -3783,7 +3783,59 @@
             </a:r>
             <a:r>
               <a:rPr lang="en-US" altLang="zh-CN" dirty="0" smtClean="0"/>
-              <a:t> ls-files -s</a:t>
+              <a:t> ls-files </a:t>
+            </a:r>
+            <a:r>
+              <a:rPr lang="en-US" altLang="zh-CN" dirty="0" smtClean="0"/>
+              <a:t>–s</a:t>
+            </a:r>
+          </a:p>
+          <a:p>
+            <a:endParaRPr lang="en-US" altLang="zh-TW" dirty="0"/>
+          </a:p>
+          <a:p>
+            <a:r>
+              <a:rPr lang="en-US" altLang="zh-TW" b="1" dirty="0" smtClean="0"/>
+              <a:t>6. </a:t>
+            </a:r>
+            <a:r>
+              <a:rPr lang="zh-CN" altLang="en-US" b="1" dirty="0" smtClean="0"/>
+              <a:t>查询</a:t>
+            </a:r>
+            <a:r>
+              <a:rPr lang="en-US" altLang="zh-CN" b="1" dirty="0" smtClean="0"/>
+              <a:t>commit</a:t>
+            </a:r>
+            <a:r>
+              <a:rPr lang="zh-CN" altLang="en-US" b="1" dirty="0"/>
+              <a:t>细节</a:t>
+            </a:r>
+            <a:endParaRPr lang="en-US" altLang="zh-CN" b="1" dirty="0" smtClean="0"/>
+          </a:p>
+          <a:p>
+            <a:r>
+              <a:rPr lang="en-US" altLang="zh-TW" dirty="0"/>
+              <a:t> </a:t>
+            </a:r>
+            <a:r>
+              <a:rPr lang="en-US" altLang="zh-TW" dirty="0" smtClean="0"/>
+              <a:t>     </a:t>
+            </a:r>
+            <a:r>
+              <a:rPr lang="en-US" altLang="zh-CN" dirty="0" err="1" smtClean="0"/>
+              <a:t>git</a:t>
+            </a:r>
+            <a:r>
+              <a:rPr lang="en-US" altLang="zh-CN" dirty="0" smtClean="0"/>
+              <a:t> show commit-sha1</a:t>
+            </a:r>
+            <a:r>
+              <a:rPr lang="zh-CN" altLang="en-US" dirty="0" smtClean="0"/>
+              <a:t>值 </a:t>
+            </a:r>
+            <a:r>
+              <a:rPr lang="en-US" altLang="zh-CN" dirty="0" smtClean="0"/>
+              <a:t>--pretty=fuller</a:t>
             </a:r>
             <a:endParaRPr lang="en-US" altLang="zh-TW" dirty="0"/>
           </a:p>

</xml_diff>

<commit_message>
Study git rev-parse and git tag
</commit_message>
<xml_diff>
--- a/GitStudy/.gitContentStudy.pptx
+++ b/GitStudy/.gitContentStudy.pptx
@@ -7,7 +7,8 @@
   <p:sldIdLst>
     <p:sldId id="256" r:id="rId2"/>
     <p:sldId id="257" r:id="rId3"/>
-    <p:sldId id="258" r:id="rId4"/>
+    <p:sldId id="259" r:id="rId4"/>
+    <p:sldId id="258" r:id="rId5"/>
   </p:sldIdLst>
   <p:sldSz cx="12192000" cy="6858000"/>
   <p:notesSz cx="6858000" cy="9144000"/>
@@ -261,7 +262,7 @@
           <a:p>
             <a:fld id="{595FB3E4-E0FF-429F-A03D-BC2618170DFD}" type="datetimeFigureOut">
               <a:rPr lang="zh-TW" altLang="en-US" smtClean="0"/>
-              <a:t>2023/1/9</a:t>
+              <a:t>2023/1/10</a:t>
             </a:fld>
             <a:endParaRPr lang="zh-TW" altLang="en-US"/>
           </a:p>
@@ -459,7 +460,7 @@
           <a:p>
             <a:fld id="{595FB3E4-E0FF-429F-A03D-BC2618170DFD}" type="datetimeFigureOut">
               <a:rPr lang="zh-TW" altLang="en-US" smtClean="0"/>
-              <a:t>2023/1/9</a:t>
+              <a:t>2023/1/10</a:t>
             </a:fld>
             <a:endParaRPr lang="zh-TW" altLang="en-US"/>
           </a:p>
@@ -667,7 +668,7 @@
           <a:p>
             <a:fld id="{595FB3E4-E0FF-429F-A03D-BC2618170DFD}" type="datetimeFigureOut">
               <a:rPr lang="zh-TW" altLang="en-US" smtClean="0"/>
-              <a:t>2023/1/9</a:t>
+              <a:t>2023/1/10</a:t>
             </a:fld>
             <a:endParaRPr lang="zh-TW" altLang="en-US"/>
           </a:p>
@@ -865,7 +866,7 @@
           <a:p>
             <a:fld id="{595FB3E4-E0FF-429F-A03D-BC2618170DFD}" type="datetimeFigureOut">
               <a:rPr lang="zh-TW" altLang="en-US" smtClean="0"/>
-              <a:t>2023/1/9</a:t>
+              <a:t>2023/1/10</a:t>
             </a:fld>
             <a:endParaRPr lang="zh-TW" altLang="en-US"/>
           </a:p>
@@ -1140,7 +1141,7 @@
           <a:p>
             <a:fld id="{595FB3E4-E0FF-429F-A03D-BC2618170DFD}" type="datetimeFigureOut">
               <a:rPr lang="zh-TW" altLang="en-US" smtClean="0"/>
-              <a:t>2023/1/9</a:t>
+              <a:t>2023/1/10</a:t>
             </a:fld>
             <a:endParaRPr lang="zh-TW" altLang="en-US"/>
           </a:p>
@@ -1405,7 +1406,7 @@
           <a:p>
             <a:fld id="{595FB3E4-E0FF-429F-A03D-BC2618170DFD}" type="datetimeFigureOut">
               <a:rPr lang="zh-TW" altLang="en-US" smtClean="0"/>
-              <a:t>2023/1/9</a:t>
+              <a:t>2023/1/10</a:t>
             </a:fld>
             <a:endParaRPr lang="zh-TW" altLang="en-US"/>
           </a:p>
@@ -1817,7 +1818,7 @@
           <a:p>
             <a:fld id="{595FB3E4-E0FF-429F-A03D-BC2618170DFD}" type="datetimeFigureOut">
               <a:rPr lang="zh-TW" altLang="en-US" smtClean="0"/>
-              <a:t>2023/1/9</a:t>
+              <a:t>2023/1/10</a:t>
             </a:fld>
             <a:endParaRPr lang="zh-TW" altLang="en-US"/>
           </a:p>
@@ -1958,7 +1959,7 @@
           <a:p>
             <a:fld id="{595FB3E4-E0FF-429F-A03D-BC2618170DFD}" type="datetimeFigureOut">
               <a:rPr lang="zh-TW" altLang="en-US" smtClean="0"/>
-              <a:t>2023/1/9</a:t>
+              <a:t>2023/1/10</a:t>
             </a:fld>
             <a:endParaRPr lang="zh-TW" altLang="en-US"/>
           </a:p>
@@ -2071,7 +2072,7 @@
           <a:p>
             <a:fld id="{595FB3E4-E0FF-429F-A03D-BC2618170DFD}" type="datetimeFigureOut">
               <a:rPr lang="zh-TW" altLang="en-US" smtClean="0"/>
-              <a:t>2023/1/9</a:t>
+              <a:t>2023/1/10</a:t>
             </a:fld>
             <a:endParaRPr lang="zh-TW" altLang="en-US"/>
           </a:p>
@@ -2382,7 +2383,7 @@
           <a:p>
             <a:fld id="{595FB3E4-E0FF-429F-A03D-BC2618170DFD}" type="datetimeFigureOut">
               <a:rPr lang="zh-TW" altLang="en-US" smtClean="0"/>
-              <a:t>2023/1/9</a:t>
+              <a:t>2023/1/10</a:t>
             </a:fld>
             <a:endParaRPr lang="zh-TW" altLang="en-US"/>
           </a:p>
@@ -2670,7 +2671,7 @@
           <a:p>
             <a:fld id="{595FB3E4-E0FF-429F-A03D-BC2618170DFD}" type="datetimeFigureOut">
               <a:rPr lang="zh-TW" altLang="en-US" smtClean="0"/>
-              <a:t>2023/1/9</a:t>
+              <a:t>2023/1/10</a:t>
             </a:fld>
             <a:endParaRPr lang="zh-TW" altLang="en-US"/>
           </a:p>
@@ -2911,7 +2912,7 @@
           <a:p>
             <a:fld id="{595FB3E4-E0FF-429F-A03D-BC2618170DFD}" type="datetimeFigureOut">
               <a:rPr lang="zh-TW" altLang="en-US" smtClean="0"/>
-              <a:t>2023/1/9</a:t>
+              <a:t>2023/1/10</a:t>
             </a:fld>
             <a:endParaRPr lang="zh-TW" altLang="en-US"/>
           </a:p>
@@ -3783,11 +3784,7 @@
             </a:r>
             <a:r>
               <a:rPr lang="en-US" altLang="zh-CN" dirty="0" smtClean="0"/>
-              <a:t> ls-files </a:t>
-            </a:r>
-            <a:r>
-              <a:rPr lang="en-US" altLang="zh-CN" dirty="0" smtClean="0"/>
-              <a:t>–s</a:t>
+              <a:t> ls-files –s</a:t>
             </a:r>
           </a:p>
           <a:p>
@@ -3855,6 +3852,148 @@
 </file>
 
 <file path=ppt/slides/slide3.xml><?xml version="1.0" encoding="utf-8"?>
+<p:sld xmlns:a="http://schemas.openxmlformats.org/drawingml/2006/main" xmlns:r="http://schemas.openxmlformats.org/officeDocument/2006/relationships" xmlns:p="http://schemas.openxmlformats.org/presentationml/2006/main">
+  <p:cSld>
+    <p:spTree>
+      <p:nvGrpSpPr>
+        <p:cNvPr id="1" name=""/>
+        <p:cNvGrpSpPr/>
+        <p:nvPr/>
+      </p:nvGrpSpPr>
+      <p:grpSpPr>
+        <a:xfrm>
+          <a:off x="0" y="0"/>
+          <a:ext cx="0" cy="0"/>
+          <a:chOff x="0" y="0"/>
+          <a:chExt cx="0" cy="0"/>
+        </a:xfrm>
+      </p:grpSpPr>
+      <p:sp>
+        <p:nvSpPr>
+          <p:cNvPr id="5" name="文本框 4"/>
+          <p:cNvSpPr txBox="1"/>
+          <p:nvPr/>
+        </p:nvSpPr>
+        <p:spPr>
+          <a:xfrm>
+            <a:off x="568036" y="374073"/>
+            <a:ext cx="10252364" cy="1846659"/>
+          </a:xfrm>
+          <a:prstGeom prst="rect">
+            <a:avLst/>
+          </a:prstGeom>
+          <a:noFill/>
+        </p:spPr>
+        <p:txBody>
+          <a:bodyPr wrap="square" rtlCol="0">
+            <a:spAutoFit/>
+          </a:bodyPr>
+          <a:lstStyle/>
+          <a:p>
+            <a:r>
+              <a:rPr lang="en-US" altLang="zh-CN" sz="2000" b="1" dirty="0" smtClean="0"/>
+              <a:t>7. </a:t>
+            </a:r>
+            <a:r>
+              <a:rPr lang="zh-CN" altLang="en-US" sz="2000" b="1" dirty="0" smtClean="0"/>
+              <a:t>查询详细的</a:t>
+            </a:r>
+            <a:r>
+              <a:rPr lang="en-US" altLang="zh-CN" sz="2000" b="1" dirty="0" smtClean="0"/>
+              <a:t>sha1</a:t>
+            </a:r>
+            <a:r>
+              <a:rPr lang="zh-CN" altLang="en-US" sz="2000" b="1" dirty="0" smtClean="0"/>
+              <a:t>值</a:t>
+            </a:r>
+            <a:endParaRPr lang="en-US" altLang="zh-CN" sz="2000" b="1" dirty="0" smtClean="0"/>
+          </a:p>
+          <a:p>
+            <a:r>
+              <a:rPr lang="en-US" altLang="zh-CN" dirty="0" smtClean="0"/>
+              <a:t>      </a:t>
+            </a:r>
+            <a:r>
+              <a:rPr lang="en-US" altLang="zh-CN" dirty="0" err="1" smtClean="0"/>
+              <a:t>git</a:t>
+            </a:r>
+            <a:r>
+              <a:rPr lang="en-US" altLang="zh-CN" dirty="0" smtClean="0"/>
+              <a:t> rev-parse </a:t>
+            </a:r>
+          </a:p>
+          <a:p>
+            <a:endParaRPr lang="en-US" altLang="zh-CN" dirty="0"/>
+          </a:p>
+          <a:p>
+            <a:r>
+              <a:rPr lang="en-US" altLang="zh-CN" sz="2000" b="1" dirty="0" smtClean="0"/>
+              <a:t>8. </a:t>
+            </a:r>
+            <a:r>
+              <a:rPr lang="zh-CN" altLang="en-US" sz="2000" b="1" dirty="0" smtClean="0"/>
+              <a:t>打</a:t>
+            </a:r>
+            <a:r>
+              <a:rPr lang="en-US" altLang="zh-CN" sz="2000" b="1" dirty="0" smtClean="0"/>
+              <a:t>tag</a:t>
+            </a:r>
+            <a:r>
+              <a:rPr lang="zh-CN" altLang="en-US" sz="2000" b="1" dirty="0" smtClean="0"/>
+              <a:t>的指令</a:t>
+            </a:r>
+            <a:endParaRPr lang="en-US" altLang="zh-CN" sz="2000" b="1" dirty="0" smtClean="0"/>
+          </a:p>
+          <a:p>
+            <a:r>
+              <a:rPr lang="en-US" altLang="zh-CN" sz="2000" b="1" dirty="0" smtClean="0"/>
+              <a:t>     </a:t>
+            </a:r>
+            <a:r>
+              <a:rPr lang="en-US" altLang="zh-CN" sz="2000" dirty="0" err="1" smtClean="0"/>
+              <a:t>git</a:t>
+            </a:r>
+            <a:r>
+              <a:rPr lang="en-US" altLang="zh-CN" sz="2000" dirty="0" smtClean="0"/>
+              <a:t> tag –m “tag</a:t>
+            </a:r>
+            <a:r>
+              <a:rPr lang="zh-CN" altLang="en-US" sz="2000" dirty="0" smtClean="0"/>
+              <a:t>描述</a:t>
+            </a:r>
+            <a:r>
+              <a:rPr lang="en-US" altLang="zh-CN" sz="2000" dirty="0" smtClean="0"/>
+              <a:t>” v1.0 sha1</a:t>
+            </a:r>
+            <a:r>
+              <a:rPr lang="zh-CN" altLang="en-US" sz="2000" dirty="0" smtClean="0"/>
+              <a:t>值</a:t>
+            </a:r>
+            <a:endParaRPr lang="en-US" altLang="zh-CN" sz="2000" dirty="0" smtClean="0"/>
+          </a:p>
+          <a:p>
+            <a:r>
+              <a:rPr lang="en-US" altLang="zh-CN" dirty="0" smtClean="0"/>
+              <a:t>      </a:t>
+            </a:r>
+            <a:endParaRPr lang="zh-CN" altLang="en-US" dirty="0"/>
+          </a:p>
+        </p:txBody>
+      </p:sp>
+    </p:spTree>
+    <p:extLst>
+      <p:ext uri="{BB962C8B-B14F-4D97-AF65-F5344CB8AC3E}">
+        <p14:creationId xmlns:p14="http://schemas.microsoft.com/office/powerpoint/2010/main" val="1328758486"/>
+      </p:ext>
+    </p:extLst>
+  </p:cSld>
+  <p:clrMapOvr>
+    <a:masterClrMapping/>
+  </p:clrMapOvr>
+</p:sld>
+</file>
+
+<file path=ppt/slides/slide4.xml><?xml version="1.0" encoding="utf-8"?>
 <p:sld xmlns:a="http://schemas.openxmlformats.org/drawingml/2006/main" xmlns:r="http://schemas.openxmlformats.org/officeDocument/2006/relationships" xmlns:p="http://schemas.openxmlformats.org/presentationml/2006/main">
   <p:cSld>
     <p:spTree>

</xml_diff>

<commit_message>
Add the git ls-files --stage in .gitContextStudy.pptx
</commit_message>
<xml_diff>
--- a/GitStudy/.gitContentStudy.pptx
+++ b/GitStudy/.gitContentStudy.pptx
@@ -262,7 +262,7 @@
           <a:p>
             <a:fld id="{595FB3E4-E0FF-429F-A03D-BC2618170DFD}" type="datetimeFigureOut">
               <a:rPr lang="zh-TW" altLang="en-US" smtClean="0"/>
-              <a:t>2023/1/10</a:t>
+              <a:t>2023/1/12</a:t>
             </a:fld>
             <a:endParaRPr lang="zh-TW" altLang="en-US"/>
           </a:p>
@@ -460,7 +460,7 @@
           <a:p>
             <a:fld id="{595FB3E4-E0FF-429F-A03D-BC2618170DFD}" type="datetimeFigureOut">
               <a:rPr lang="zh-TW" altLang="en-US" smtClean="0"/>
-              <a:t>2023/1/10</a:t>
+              <a:t>2023/1/12</a:t>
             </a:fld>
             <a:endParaRPr lang="zh-TW" altLang="en-US"/>
           </a:p>
@@ -668,7 +668,7 @@
           <a:p>
             <a:fld id="{595FB3E4-E0FF-429F-A03D-BC2618170DFD}" type="datetimeFigureOut">
               <a:rPr lang="zh-TW" altLang="en-US" smtClean="0"/>
-              <a:t>2023/1/10</a:t>
+              <a:t>2023/1/12</a:t>
             </a:fld>
             <a:endParaRPr lang="zh-TW" altLang="en-US"/>
           </a:p>
@@ -866,7 +866,7 @@
           <a:p>
             <a:fld id="{595FB3E4-E0FF-429F-A03D-BC2618170DFD}" type="datetimeFigureOut">
               <a:rPr lang="zh-TW" altLang="en-US" smtClean="0"/>
-              <a:t>2023/1/10</a:t>
+              <a:t>2023/1/12</a:t>
             </a:fld>
             <a:endParaRPr lang="zh-TW" altLang="en-US"/>
           </a:p>
@@ -1141,7 +1141,7 @@
           <a:p>
             <a:fld id="{595FB3E4-E0FF-429F-A03D-BC2618170DFD}" type="datetimeFigureOut">
               <a:rPr lang="zh-TW" altLang="en-US" smtClean="0"/>
-              <a:t>2023/1/10</a:t>
+              <a:t>2023/1/12</a:t>
             </a:fld>
             <a:endParaRPr lang="zh-TW" altLang="en-US"/>
           </a:p>
@@ -1406,7 +1406,7 @@
           <a:p>
             <a:fld id="{595FB3E4-E0FF-429F-A03D-BC2618170DFD}" type="datetimeFigureOut">
               <a:rPr lang="zh-TW" altLang="en-US" smtClean="0"/>
-              <a:t>2023/1/10</a:t>
+              <a:t>2023/1/12</a:t>
             </a:fld>
             <a:endParaRPr lang="zh-TW" altLang="en-US"/>
           </a:p>
@@ -1818,7 +1818,7 @@
           <a:p>
             <a:fld id="{595FB3E4-E0FF-429F-A03D-BC2618170DFD}" type="datetimeFigureOut">
               <a:rPr lang="zh-TW" altLang="en-US" smtClean="0"/>
-              <a:t>2023/1/10</a:t>
+              <a:t>2023/1/12</a:t>
             </a:fld>
             <a:endParaRPr lang="zh-TW" altLang="en-US"/>
           </a:p>
@@ -1959,7 +1959,7 @@
           <a:p>
             <a:fld id="{595FB3E4-E0FF-429F-A03D-BC2618170DFD}" type="datetimeFigureOut">
               <a:rPr lang="zh-TW" altLang="en-US" smtClean="0"/>
-              <a:t>2023/1/10</a:t>
+              <a:t>2023/1/12</a:t>
             </a:fld>
             <a:endParaRPr lang="zh-TW" altLang="en-US"/>
           </a:p>
@@ -2072,7 +2072,7 @@
           <a:p>
             <a:fld id="{595FB3E4-E0FF-429F-A03D-BC2618170DFD}" type="datetimeFigureOut">
               <a:rPr lang="zh-TW" altLang="en-US" smtClean="0"/>
-              <a:t>2023/1/10</a:t>
+              <a:t>2023/1/12</a:t>
             </a:fld>
             <a:endParaRPr lang="zh-TW" altLang="en-US"/>
           </a:p>
@@ -2383,7 +2383,7 @@
           <a:p>
             <a:fld id="{595FB3E4-E0FF-429F-A03D-BC2618170DFD}" type="datetimeFigureOut">
               <a:rPr lang="zh-TW" altLang="en-US" smtClean="0"/>
-              <a:t>2023/1/10</a:t>
+              <a:t>2023/1/12</a:t>
             </a:fld>
             <a:endParaRPr lang="zh-TW" altLang="en-US"/>
           </a:p>
@@ -2671,7 +2671,7 @@
           <a:p>
             <a:fld id="{595FB3E4-E0FF-429F-A03D-BC2618170DFD}" type="datetimeFigureOut">
               <a:rPr lang="zh-TW" altLang="en-US" smtClean="0"/>
-              <a:t>2023/1/10</a:t>
+              <a:t>2023/1/12</a:t>
             </a:fld>
             <a:endParaRPr lang="zh-TW" altLang="en-US"/>
           </a:p>
@@ -2912,7 +2912,7 @@
           <a:p>
             <a:fld id="{595FB3E4-E0FF-429F-A03D-BC2618170DFD}" type="datetimeFigureOut">
               <a:rPr lang="zh-TW" altLang="en-US" smtClean="0"/>
-              <a:t>2023/1/10</a:t>
+              <a:t>2023/1/12</a:t>
             </a:fld>
             <a:endParaRPr lang="zh-TW" altLang="en-US"/>
           </a:p>
@@ -3713,29 +3713,25 @@
           <a:p>
             <a:r>
               <a:rPr lang="en-US" altLang="zh-CN" sz="2000" b="1" dirty="0"/>
-              <a:t>4</a:t>
-            </a:r>
-            <a:r>
-              <a:rPr lang="en-US" altLang="zh-CN" sz="2000" b="1" dirty="0" smtClean="0"/>
-              <a:t>. </a:t>
-            </a:r>
-            <a:r>
-              <a:rPr lang="zh-CN" altLang="en-US" sz="2000" b="1" dirty="0" smtClean="0"/>
+              <a:t>4. </a:t>
+            </a:r>
+            <a:r>
+              <a:rPr lang="zh-CN" altLang="en-US" sz="2000" b="1" dirty="0"/>
               <a:t>捕获索引状态被把它保存在</a:t>
             </a:r>
             <a:r>
-              <a:rPr lang="en-US" altLang="zh-CN" sz="2000" b="1" dirty="0" smtClean="0"/>
+              <a:rPr lang="en-US" altLang="zh-CN" sz="2000" b="1" dirty="0"/>
               <a:t>tree</a:t>
             </a:r>
             <a:r>
-              <a:rPr lang="zh-CN" altLang="en-US" sz="2000" b="1" dirty="0" smtClean="0"/>
+              <a:rPr lang="zh-CN" altLang="en-US" sz="2000" b="1" dirty="0"/>
               <a:t>里面</a:t>
             </a:r>
-            <a:endParaRPr lang="en-US" altLang="zh-CN" sz="2000" b="1" dirty="0" smtClean="0"/>
-          </a:p>
-          <a:p>
-            <a:r>
-              <a:rPr lang="en-US" altLang="zh-TW" dirty="0" smtClean="0"/>
+            <a:endParaRPr lang="en-US" altLang="zh-CN" sz="2000" b="1" dirty="0"/>
+          </a:p>
+          <a:p>
+            <a:r>
+              <a:rPr lang="en-US" altLang="zh-TW" dirty="0"/>
               <a:t>       </a:t>
             </a:r>
             <a:r>
@@ -3744,11 +3740,7 @@
             </a:r>
             <a:r>
               <a:rPr lang="en-US" altLang="zh-TW" dirty="0"/>
-              <a:t> </a:t>
-            </a:r>
-            <a:r>
-              <a:rPr lang="en-US" altLang="zh-TW" dirty="0" smtClean="0"/>
-              <a:t>write-tree</a:t>
+              <a:t> write-tree</a:t>
             </a:r>
           </a:p>
           <a:p>
@@ -3756,34 +3748,34 @@
           </a:p>
           <a:p>
             <a:r>
-              <a:rPr lang="en-US" altLang="zh-TW" sz="2000" b="1" dirty="0" smtClean="0"/>
+              <a:rPr lang="en-US" altLang="zh-TW" sz="2000" b="1" dirty="0"/>
               <a:t>5. </a:t>
             </a:r>
             <a:r>
-              <a:rPr lang="zh-CN" altLang="en-US" sz="2000" b="1" dirty="0" smtClean="0"/>
+              <a:rPr lang="zh-CN" altLang="en-US" sz="2000" b="1" dirty="0"/>
               <a:t>查询目前</a:t>
             </a:r>
             <a:r>
-              <a:rPr lang="en-US" altLang="zh-CN" sz="2000" b="1" dirty="0" smtClean="0"/>
+              <a:rPr lang="en-US" altLang="zh-CN" sz="2000" b="1" dirty="0"/>
               <a:t>tree</a:t>
             </a:r>
             <a:r>
-              <a:rPr lang="zh-CN" altLang="en-US" sz="2000" b="1" dirty="0" smtClean="0"/>
+              <a:rPr lang="zh-CN" altLang="en-US" sz="2000" b="1" dirty="0"/>
               <a:t>里面的文件</a:t>
             </a:r>
-            <a:endParaRPr lang="en-US" altLang="zh-CN" sz="2000" b="1" dirty="0" smtClean="0"/>
-          </a:p>
-          <a:p>
-            <a:r>
-              <a:rPr lang="en-US" altLang="zh-TW" dirty="0" smtClean="0"/>
+            <a:endParaRPr lang="en-US" altLang="zh-CN" sz="2000" b="1" dirty="0"/>
+          </a:p>
+          <a:p>
+            <a:r>
+              <a:rPr lang="en-US" altLang="zh-TW" dirty="0"/>
               <a:t>      </a:t>
             </a:r>
             <a:r>
-              <a:rPr lang="en-US" altLang="zh-CN" dirty="0" err="1" smtClean="0"/>
+              <a:rPr lang="en-US" altLang="zh-CN" dirty="0" err="1"/>
               <a:t>git</a:t>
             </a:r>
             <a:r>
-              <a:rPr lang="en-US" altLang="zh-CN" dirty="0" smtClean="0"/>
+              <a:rPr lang="en-US" altLang="zh-CN" dirty="0"/>
               <a:t> ls-files –s</a:t>
             </a:r>
           </a:p>
@@ -3792,46 +3784,42 @@
           </a:p>
           <a:p>
             <a:r>
-              <a:rPr lang="en-US" altLang="zh-TW" b="1" dirty="0" smtClean="0"/>
+              <a:rPr lang="en-US" altLang="zh-TW" b="1" dirty="0"/>
               <a:t>6. </a:t>
             </a:r>
             <a:r>
-              <a:rPr lang="zh-CN" altLang="en-US" b="1" dirty="0" smtClean="0"/>
+              <a:rPr lang="zh-CN" altLang="en-US" b="1" dirty="0"/>
               <a:t>查询</a:t>
             </a:r>
             <a:r>
-              <a:rPr lang="en-US" altLang="zh-CN" b="1" dirty="0" smtClean="0"/>
+              <a:rPr lang="en-US" altLang="zh-CN" b="1" dirty="0"/>
               <a:t>commit</a:t>
             </a:r>
             <a:r>
               <a:rPr lang="zh-CN" altLang="en-US" b="1" dirty="0"/>
               <a:t>细节</a:t>
             </a:r>
-            <a:endParaRPr lang="en-US" altLang="zh-CN" b="1" dirty="0" smtClean="0"/>
+            <a:endParaRPr lang="en-US" altLang="zh-CN" b="1" dirty="0"/>
           </a:p>
           <a:p>
             <a:r>
               <a:rPr lang="en-US" altLang="zh-TW" dirty="0"/>
-              <a:t> </a:t>
-            </a:r>
-            <a:r>
-              <a:rPr lang="en-US" altLang="zh-TW" dirty="0" smtClean="0"/>
-              <a:t>     </a:t>
-            </a:r>
-            <a:r>
-              <a:rPr lang="en-US" altLang="zh-CN" dirty="0" err="1" smtClean="0"/>
+              <a:t>      </a:t>
+            </a:r>
+            <a:r>
+              <a:rPr lang="en-US" altLang="zh-CN" dirty="0" err="1"/>
               <a:t>git</a:t>
             </a:r>
             <a:r>
-              <a:rPr lang="en-US" altLang="zh-CN" dirty="0" smtClean="0"/>
+              <a:rPr lang="en-US" altLang="zh-CN" dirty="0"/>
               <a:t> show commit-sha1</a:t>
             </a:r>
             <a:r>
-              <a:rPr lang="zh-CN" altLang="en-US" dirty="0" smtClean="0"/>
+              <a:rPr lang="zh-CN" altLang="en-US" dirty="0"/>
               <a:t>值 </a:t>
             </a:r>
             <a:r>
-              <a:rPr lang="en-US" altLang="zh-CN" dirty="0" smtClean="0"/>
+              <a:rPr lang="en-US" altLang="zh-CN" dirty="0"/>
               <a:t>--pretty=fuller</a:t>
             </a:r>
             <a:endParaRPr lang="en-US" altLang="zh-TW" dirty="0"/>
@@ -3877,7 +3865,7 @@
         <p:spPr>
           <a:xfrm>
             <a:off x="568036" y="374073"/>
-            <a:ext cx="10252364" cy="1846659"/>
+            <a:ext cx="10252364" cy="2769989"/>
           </a:xfrm>
           <a:prstGeom prst="rect">
             <a:avLst/>
@@ -3891,34 +3879,34 @@
           <a:lstStyle/>
           <a:p>
             <a:r>
-              <a:rPr lang="en-US" altLang="zh-CN" sz="2000" b="1" dirty="0" smtClean="0"/>
+              <a:rPr lang="en-US" altLang="zh-CN" sz="2000" b="1" dirty="0"/>
               <a:t>7. </a:t>
             </a:r>
             <a:r>
-              <a:rPr lang="zh-CN" altLang="en-US" sz="2000" b="1" dirty="0" smtClean="0"/>
+              <a:rPr lang="zh-CN" altLang="en-US" sz="2000" b="1" dirty="0"/>
               <a:t>查询详细的</a:t>
             </a:r>
             <a:r>
-              <a:rPr lang="en-US" altLang="zh-CN" sz="2000" b="1" dirty="0" smtClean="0"/>
+              <a:rPr lang="en-US" altLang="zh-CN" sz="2000" b="1" dirty="0"/>
               <a:t>sha1</a:t>
             </a:r>
             <a:r>
-              <a:rPr lang="zh-CN" altLang="en-US" sz="2000" b="1" dirty="0" smtClean="0"/>
+              <a:rPr lang="zh-CN" altLang="en-US" sz="2000" b="1" dirty="0"/>
               <a:t>值</a:t>
             </a:r>
-            <a:endParaRPr lang="en-US" altLang="zh-CN" sz="2000" b="1" dirty="0" smtClean="0"/>
-          </a:p>
-          <a:p>
-            <a:r>
-              <a:rPr lang="en-US" altLang="zh-CN" dirty="0" smtClean="0"/>
+            <a:endParaRPr lang="en-US" altLang="zh-CN" sz="2000" b="1" dirty="0"/>
+          </a:p>
+          <a:p>
+            <a:r>
+              <a:rPr lang="en-US" altLang="zh-CN" dirty="0"/>
               <a:t>      </a:t>
             </a:r>
             <a:r>
-              <a:rPr lang="en-US" altLang="zh-CN" dirty="0" err="1" smtClean="0"/>
+              <a:rPr lang="en-US" altLang="zh-CN" dirty="0" err="1"/>
               <a:t>git</a:t>
             </a:r>
             <a:r>
-              <a:rPr lang="en-US" altLang="zh-CN" dirty="0" smtClean="0"/>
+              <a:rPr lang="en-US" altLang="zh-CN" dirty="0"/>
               <a:t> rev-parse </a:t>
             </a:r>
           </a:p>
@@ -3927,53 +3915,81 @@
           </a:p>
           <a:p>
             <a:r>
-              <a:rPr lang="en-US" altLang="zh-CN" sz="2000" b="1" dirty="0" smtClean="0"/>
+              <a:rPr lang="en-US" altLang="zh-CN" sz="2000" b="1" dirty="0"/>
               <a:t>8. </a:t>
             </a:r>
             <a:r>
-              <a:rPr lang="zh-CN" altLang="en-US" sz="2000" b="1" dirty="0" smtClean="0"/>
+              <a:rPr lang="zh-CN" altLang="en-US" sz="2000" b="1" dirty="0"/>
               <a:t>打</a:t>
             </a:r>
             <a:r>
-              <a:rPr lang="en-US" altLang="zh-CN" sz="2000" b="1" dirty="0" smtClean="0"/>
+              <a:rPr lang="en-US" altLang="zh-CN" sz="2000" b="1" dirty="0"/>
               <a:t>tag</a:t>
             </a:r>
             <a:r>
-              <a:rPr lang="zh-CN" altLang="en-US" sz="2000" b="1" dirty="0" smtClean="0"/>
+              <a:rPr lang="zh-CN" altLang="en-US" sz="2000" b="1" dirty="0"/>
               <a:t>的指令</a:t>
             </a:r>
-            <a:endParaRPr lang="en-US" altLang="zh-CN" sz="2000" b="1" dirty="0" smtClean="0"/>
-          </a:p>
-          <a:p>
-            <a:r>
-              <a:rPr lang="en-US" altLang="zh-CN" sz="2000" b="1" dirty="0" smtClean="0"/>
+            <a:endParaRPr lang="en-US" altLang="zh-CN" sz="2000" b="1" dirty="0"/>
+          </a:p>
+          <a:p>
+            <a:r>
+              <a:rPr lang="en-US" altLang="zh-CN" sz="2000" b="1" dirty="0"/>
               <a:t>     </a:t>
             </a:r>
             <a:r>
-              <a:rPr lang="en-US" altLang="zh-CN" sz="2000" dirty="0" err="1" smtClean="0"/>
+              <a:rPr lang="en-US" altLang="zh-CN" sz="2000" dirty="0" err="1"/>
               <a:t>git</a:t>
             </a:r>
             <a:r>
-              <a:rPr lang="en-US" altLang="zh-CN" sz="2000" dirty="0" smtClean="0"/>
+              <a:rPr lang="en-US" altLang="zh-CN" sz="2000" dirty="0"/>
               <a:t> tag –m “tag</a:t>
             </a:r>
             <a:r>
-              <a:rPr lang="zh-CN" altLang="en-US" sz="2000" dirty="0" smtClean="0"/>
+              <a:rPr lang="zh-CN" altLang="en-US" sz="2000" dirty="0"/>
               <a:t>描述</a:t>
             </a:r>
             <a:r>
-              <a:rPr lang="en-US" altLang="zh-CN" sz="2000" dirty="0" smtClean="0"/>
+              <a:rPr lang="en-US" altLang="zh-CN" sz="2000" dirty="0"/>
               <a:t>” v1.0 sha1</a:t>
             </a:r>
             <a:r>
-              <a:rPr lang="zh-CN" altLang="en-US" sz="2000" dirty="0" smtClean="0"/>
+              <a:rPr lang="zh-CN" altLang="en-US" sz="2000" dirty="0"/>
               <a:t>值</a:t>
             </a:r>
-            <a:endParaRPr lang="en-US" altLang="zh-CN" sz="2000" dirty="0" smtClean="0"/>
-          </a:p>
-          <a:p>
-            <a:r>
-              <a:rPr lang="en-US" altLang="zh-CN" dirty="0" smtClean="0"/>
+            <a:endParaRPr lang="en-US" altLang="zh-CN" sz="2000" dirty="0"/>
+          </a:p>
+          <a:p>
+            <a:endParaRPr lang="en-US" altLang="zh-CN" sz="2000" dirty="0"/>
+          </a:p>
+          <a:p>
+            <a:r>
+              <a:rPr lang="en-US" altLang="zh-CN" sz="2000" b="1" dirty="0"/>
+              <a:t>9. </a:t>
+            </a:r>
+            <a:r>
+              <a:rPr lang="zh-CN" altLang="en-US" sz="2000" b="1" dirty="0"/>
+              <a:t>查看暫存文件的</a:t>
+            </a:r>
+            <a:r>
+              <a:rPr lang="en-US" altLang="zh-CN" sz="2000" b="1" dirty="0"/>
+              <a:t>sha1</a:t>
+            </a:r>
+            <a:r>
+              <a:rPr lang="zh-CN" altLang="en-US" sz="2000" b="1" dirty="0"/>
+              <a:t>值</a:t>
+            </a:r>
+            <a:endParaRPr lang="en-US" altLang="zh-CN" sz="2000" b="1" dirty="0"/>
+          </a:p>
+          <a:p>
+            <a:r>
+              <a:rPr lang="en-US" altLang="zh-CN" sz="2000" dirty="0"/>
+              <a:t>      git ls-files --stage</a:t>
+            </a:r>
+          </a:p>
+          <a:p>
+            <a:r>
+              <a:rPr lang="en-US" altLang="zh-CN" dirty="0"/>
               <a:t>      </a:t>
             </a:r>
             <a:endParaRPr lang="zh-CN" altLang="en-US" dirty="0"/>
@@ -4136,19 +4152,19 @@
               <a:buAutoNum type="arabicPeriod"/>
             </a:pPr>
             <a:r>
-              <a:rPr lang="en-US" altLang="zh-CN" dirty="0" err="1" smtClean="0"/>
+              <a:rPr lang="en-US" altLang="zh-CN" dirty="0" err="1"/>
               <a:t>git</a:t>
             </a:r>
             <a:r>
-              <a:rPr lang="en-US" altLang="zh-CN" dirty="0" smtClean="0"/>
+              <a:rPr lang="en-US" altLang="zh-CN" dirty="0"/>
               <a:t>   add </a:t>
             </a:r>
             <a:r>
-              <a:rPr lang="zh-CN" altLang="en-US" dirty="0" smtClean="0"/>
+              <a:rPr lang="zh-CN" altLang="en-US" dirty="0"/>
               <a:t>指令后产生</a:t>
             </a:r>
             <a:r>
-              <a:rPr lang="en-US" altLang="zh-CN" dirty="0" smtClean="0"/>
+              <a:rPr lang="en-US" altLang="zh-CN" dirty="0"/>
               <a:t>blob</a:t>
             </a:r>
           </a:p>
@@ -4157,27 +4173,27 @@
               <a:buAutoNum type="arabicPeriod"/>
             </a:pPr>
             <a:r>
-              <a:rPr lang="en-US" altLang="zh-CN" dirty="0" err="1" smtClean="0"/>
+              <a:rPr lang="en-US" altLang="zh-CN" dirty="0" err="1"/>
               <a:t>git</a:t>
             </a:r>
             <a:r>
-              <a:rPr lang="en-US" altLang="zh-CN" dirty="0" smtClean="0"/>
+              <a:rPr lang="en-US" altLang="zh-CN" dirty="0"/>
               <a:t>   commit</a:t>
             </a:r>
             <a:r>
-              <a:rPr lang="zh-CN" altLang="en-US" dirty="0" smtClean="0"/>
+              <a:rPr lang="zh-CN" altLang="en-US" dirty="0"/>
               <a:t>产生</a:t>
             </a:r>
             <a:r>
-              <a:rPr lang="en-US" altLang="zh-CN" dirty="0" smtClean="0"/>
+              <a:rPr lang="en-US" altLang="zh-CN" dirty="0"/>
               <a:t>commit</a:t>
             </a:r>
             <a:r>
-              <a:rPr lang="zh-CN" altLang="en-US" dirty="0" smtClean="0"/>
+              <a:rPr lang="zh-CN" altLang="en-US" dirty="0"/>
               <a:t>和</a:t>
             </a:r>
             <a:r>
-              <a:rPr lang="en-US" altLang="zh-CN" dirty="0" smtClean="0"/>
+              <a:rPr lang="en-US" altLang="zh-CN" dirty="0"/>
               <a:t>tree</a:t>
             </a:r>
           </a:p>
@@ -4186,27 +4202,27 @@
               <a:buAutoNum type="arabicPeriod"/>
             </a:pPr>
             <a:r>
-              <a:rPr lang="zh-CN" altLang="en-US" dirty="0" smtClean="0"/>
+              <a:rPr lang="zh-CN" altLang="en-US" dirty="0"/>
               <a:t>目录下的文件夹有文件会额外产生</a:t>
             </a:r>
             <a:r>
-              <a:rPr lang="en-US" altLang="zh-CN" dirty="0" smtClean="0"/>
+              <a:rPr lang="en-US" altLang="zh-CN" dirty="0"/>
               <a:t>tree, </a:t>
             </a:r>
             <a:r>
-              <a:rPr lang="zh-CN" altLang="en-US" dirty="0" smtClean="0"/>
+              <a:rPr lang="zh-CN" altLang="en-US" dirty="0"/>
               <a:t>此</a:t>
             </a:r>
             <a:r>
-              <a:rPr lang="en-US" altLang="zh-CN" dirty="0" smtClean="0"/>
+              <a:rPr lang="en-US" altLang="zh-CN" dirty="0"/>
               <a:t>tree</a:t>
             </a:r>
             <a:r>
-              <a:rPr lang="zh-CN" altLang="en-US" dirty="0" smtClean="0"/>
+              <a:rPr lang="zh-CN" altLang="en-US" dirty="0"/>
               <a:t>会指向上个</a:t>
             </a:r>
             <a:r>
-              <a:rPr lang="en-US" altLang="zh-CN" dirty="0" smtClean="0"/>
+              <a:rPr lang="en-US" altLang="zh-CN" dirty="0"/>
               <a:t>blob </a:t>
             </a:r>
             <a:endParaRPr lang="zh-CN" altLang="en-US" dirty="0"/>

</xml_diff>

<commit_message>
Tidy command in pptx
</commit_message>
<xml_diff>
--- a/GitStudy/.gitContentStudy.pptx
+++ b/GitStudy/.gitContentStudy.pptx
@@ -262,7 +262,7 @@
           <a:p>
             <a:fld id="{595FB3E4-E0FF-429F-A03D-BC2618170DFD}" type="datetimeFigureOut">
               <a:rPr lang="zh-TW" altLang="en-US" smtClean="0"/>
-              <a:t>2023/1/12</a:t>
+              <a:t>2023/1/28</a:t>
             </a:fld>
             <a:endParaRPr lang="zh-TW" altLang="en-US"/>
           </a:p>
@@ -460,7 +460,7 @@
           <a:p>
             <a:fld id="{595FB3E4-E0FF-429F-A03D-BC2618170DFD}" type="datetimeFigureOut">
               <a:rPr lang="zh-TW" altLang="en-US" smtClean="0"/>
-              <a:t>2023/1/12</a:t>
+              <a:t>2023/1/28</a:t>
             </a:fld>
             <a:endParaRPr lang="zh-TW" altLang="en-US"/>
           </a:p>
@@ -668,7 +668,7 @@
           <a:p>
             <a:fld id="{595FB3E4-E0FF-429F-A03D-BC2618170DFD}" type="datetimeFigureOut">
               <a:rPr lang="zh-TW" altLang="en-US" smtClean="0"/>
-              <a:t>2023/1/12</a:t>
+              <a:t>2023/1/28</a:t>
             </a:fld>
             <a:endParaRPr lang="zh-TW" altLang="en-US"/>
           </a:p>
@@ -866,7 +866,7 @@
           <a:p>
             <a:fld id="{595FB3E4-E0FF-429F-A03D-BC2618170DFD}" type="datetimeFigureOut">
               <a:rPr lang="zh-TW" altLang="en-US" smtClean="0"/>
-              <a:t>2023/1/12</a:t>
+              <a:t>2023/1/28</a:t>
             </a:fld>
             <a:endParaRPr lang="zh-TW" altLang="en-US"/>
           </a:p>
@@ -1141,7 +1141,7 @@
           <a:p>
             <a:fld id="{595FB3E4-E0FF-429F-A03D-BC2618170DFD}" type="datetimeFigureOut">
               <a:rPr lang="zh-TW" altLang="en-US" smtClean="0"/>
-              <a:t>2023/1/12</a:t>
+              <a:t>2023/1/28</a:t>
             </a:fld>
             <a:endParaRPr lang="zh-TW" altLang="en-US"/>
           </a:p>
@@ -1406,7 +1406,7 @@
           <a:p>
             <a:fld id="{595FB3E4-E0FF-429F-A03D-BC2618170DFD}" type="datetimeFigureOut">
               <a:rPr lang="zh-TW" altLang="en-US" smtClean="0"/>
-              <a:t>2023/1/12</a:t>
+              <a:t>2023/1/28</a:t>
             </a:fld>
             <a:endParaRPr lang="zh-TW" altLang="en-US"/>
           </a:p>
@@ -1818,7 +1818,7 @@
           <a:p>
             <a:fld id="{595FB3E4-E0FF-429F-A03D-BC2618170DFD}" type="datetimeFigureOut">
               <a:rPr lang="zh-TW" altLang="en-US" smtClean="0"/>
-              <a:t>2023/1/12</a:t>
+              <a:t>2023/1/28</a:t>
             </a:fld>
             <a:endParaRPr lang="zh-TW" altLang="en-US"/>
           </a:p>
@@ -1959,7 +1959,7 @@
           <a:p>
             <a:fld id="{595FB3E4-E0FF-429F-A03D-BC2618170DFD}" type="datetimeFigureOut">
               <a:rPr lang="zh-TW" altLang="en-US" smtClean="0"/>
-              <a:t>2023/1/12</a:t>
+              <a:t>2023/1/28</a:t>
             </a:fld>
             <a:endParaRPr lang="zh-TW" altLang="en-US"/>
           </a:p>
@@ -2072,7 +2072,7 @@
           <a:p>
             <a:fld id="{595FB3E4-E0FF-429F-A03D-BC2618170DFD}" type="datetimeFigureOut">
               <a:rPr lang="zh-TW" altLang="en-US" smtClean="0"/>
-              <a:t>2023/1/12</a:t>
+              <a:t>2023/1/28</a:t>
             </a:fld>
             <a:endParaRPr lang="zh-TW" altLang="en-US"/>
           </a:p>
@@ -2383,7 +2383,7 @@
           <a:p>
             <a:fld id="{595FB3E4-E0FF-429F-A03D-BC2618170DFD}" type="datetimeFigureOut">
               <a:rPr lang="zh-TW" altLang="en-US" smtClean="0"/>
-              <a:t>2023/1/12</a:t>
+              <a:t>2023/1/28</a:t>
             </a:fld>
             <a:endParaRPr lang="zh-TW" altLang="en-US"/>
           </a:p>
@@ -2671,7 +2671,7 @@
           <a:p>
             <a:fld id="{595FB3E4-E0FF-429F-A03D-BC2618170DFD}" type="datetimeFigureOut">
               <a:rPr lang="zh-TW" altLang="en-US" smtClean="0"/>
-              <a:t>2023/1/12</a:t>
+              <a:t>2023/1/28</a:t>
             </a:fld>
             <a:endParaRPr lang="zh-TW" altLang="en-US"/>
           </a:p>
@@ -2912,7 +2912,7 @@
           <a:p>
             <a:fld id="{595FB3E4-E0FF-429F-A03D-BC2618170DFD}" type="datetimeFigureOut">
               <a:rPr lang="zh-TW" altLang="en-US" smtClean="0"/>
-              <a:t>2023/1/12</a:t>
+              <a:t>2023/1/28</a:t>
             </a:fld>
             <a:endParaRPr lang="zh-TW" altLang="en-US"/>
           </a:p>
@@ -3752,16 +3752,12 @@
               <a:t>5. </a:t>
             </a:r>
             <a:r>
+              <a:rPr lang="zh-CN" altLang="en-US" sz="2000" b="1" smtClean="0"/>
+              <a:t>查询暂存的</a:t>
+            </a:r>
+            <a:r>
               <a:rPr lang="zh-CN" altLang="en-US" sz="2000" b="1" dirty="0"/>
-              <a:t>查询目前</a:t>
-            </a:r>
-            <a:r>
-              <a:rPr lang="en-US" altLang="zh-CN" sz="2000" b="1" dirty="0"/>
-              <a:t>tree</a:t>
-            </a:r>
-            <a:r>
-              <a:rPr lang="zh-CN" altLang="en-US" sz="2000" b="1" dirty="0"/>
-              <a:t>里面的文件</a:t>
+              <a:t>文件</a:t>
             </a:r>
             <a:endParaRPr lang="en-US" altLang="zh-CN" sz="2000" b="1" dirty="0"/>
           </a:p>

</xml_diff>